<commit_message>
Added Week 4 course materials
</commit_message>
<xml_diff>
--- a/Training Materials/Week 3/Day 2/Servlets and JSPs/Slides/3. HTTP and the Tomcat Architecture/http-and-the-tomcat-architecture-slides.pptx
+++ b/Training Materials/Week 3/Day 2/Servlets and JSPs/Slides/3. HTTP and the Tomcat Architecture/http-and-the-tomcat-architecture-slides.pptx
@@ -36774,7 +36774,21 @@
                 <a:latin typeface="Verdana" panose="020B0604030504040204"/>
                 <a:cs typeface="Verdana" panose="020B0604030504040204"/>
               </a:rPr>
-              <a:t>destory(</a:t>
+              <a:t>dest</a:t>
+            </a:r>
+            <a:r>
+              <a:rPr lang="en-US" sz="1800" spc="5" dirty="0">
+                <a:latin typeface="Verdana" panose="020B0604030504040204"/>
+                <a:cs typeface="Verdana" panose="020B0604030504040204"/>
+              </a:rPr>
+              <a:t>r</a:t>
+            </a:r>
+            <a:r>
+              <a:rPr sz="1800" spc="5" dirty="0">
+                <a:latin typeface="Verdana" panose="020B0604030504040204"/>
+                <a:cs typeface="Verdana" panose="020B0604030504040204"/>
+              </a:rPr>
+              <a:t>oy(</a:t>
             </a:r>
             <a:r>
               <a:rPr sz="1800" spc="-135" dirty="0">

</xml_diff>